<commit_message>
not really sure what changed tbh
</commit_message>
<xml_diff>
--- a/figures/Fst_relabelled no color for pop.pptx
+++ b/figures/Fst_relabelled no color for pop.pptx
@@ -6,8 +6,9 @@
   </p:sldMasterIdLst>
   <p:sldIdLst>
     <p:sldId id="258" r:id="rId2"/>
-    <p:sldId id="256" r:id="rId3"/>
-    <p:sldId id="257" r:id="rId4"/>
+    <p:sldId id="259" r:id="rId3"/>
+    <p:sldId id="256" r:id="rId4"/>
+    <p:sldId id="257" r:id="rId5"/>
   </p:sldIdLst>
   <p:sldSz cx="12192000" cy="6858000"/>
   <p:notesSz cx="6858000" cy="9144000"/>
@@ -261,7 +262,7 @@
           <a:p>
             <a:fld id="{C2E56E9F-FC5E-47A3-91A2-81E36A74ACFE}" type="datetimeFigureOut">
               <a:rPr lang="en-US" smtClean="0"/>
-              <a:t>7/26/2022</a:t>
+              <a:t>9/1/2023</a:t>
             </a:fld>
             <a:endParaRPr lang="en-US"/>
           </a:p>
@@ -459,7 +460,7 @@
           <a:p>
             <a:fld id="{C2E56E9F-FC5E-47A3-91A2-81E36A74ACFE}" type="datetimeFigureOut">
               <a:rPr lang="en-US" smtClean="0"/>
-              <a:t>7/26/2022</a:t>
+              <a:t>9/1/2023</a:t>
             </a:fld>
             <a:endParaRPr lang="en-US"/>
           </a:p>
@@ -667,7 +668,7 @@
           <a:p>
             <a:fld id="{C2E56E9F-FC5E-47A3-91A2-81E36A74ACFE}" type="datetimeFigureOut">
               <a:rPr lang="en-US" smtClean="0"/>
-              <a:t>7/26/2022</a:t>
+              <a:t>9/1/2023</a:t>
             </a:fld>
             <a:endParaRPr lang="en-US"/>
           </a:p>
@@ -865,7 +866,7 @@
           <a:p>
             <a:fld id="{C2E56E9F-FC5E-47A3-91A2-81E36A74ACFE}" type="datetimeFigureOut">
               <a:rPr lang="en-US" smtClean="0"/>
-              <a:t>7/26/2022</a:t>
+              <a:t>9/1/2023</a:t>
             </a:fld>
             <a:endParaRPr lang="en-US"/>
           </a:p>
@@ -1140,7 +1141,7 @@
           <a:p>
             <a:fld id="{C2E56E9F-FC5E-47A3-91A2-81E36A74ACFE}" type="datetimeFigureOut">
               <a:rPr lang="en-US" smtClean="0"/>
-              <a:t>7/26/2022</a:t>
+              <a:t>9/1/2023</a:t>
             </a:fld>
             <a:endParaRPr lang="en-US"/>
           </a:p>
@@ -1405,7 +1406,7 @@
           <a:p>
             <a:fld id="{C2E56E9F-FC5E-47A3-91A2-81E36A74ACFE}" type="datetimeFigureOut">
               <a:rPr lang="en-US" smtClean="0"/>
-              <a:t>7/26/2022</a:t>
+              <a:t>9/1/2023</a:t>
             </a:fld>
             <a:endParaRPr lang="en-US"/>
           </a:p>
@@ -1817,7 +1818,7 @@
           <a:p>
             <a:fld id="{C2E56E9F-FC5E-47A3-91A2-81E36A74ACFE}" type="datetimeFigureOut">
               <a:rPr lang="en-US" smtClean="0"/>
-              <a:t>7/26/2022</a:t>
+              <a:t>9/1/2023</a:t>
             </a:fld>
             <a:endParaRPr lang="en-US"/>
           </a:p>
@@ -1958,7 +1959,7 @@
           <a:p>
             <a:fld id="{C2E56E9F-FC5E-47A3-91A2-81E36A74ACFE}" type="datetimeFigureOut">
               <a:rPr lang="en-US" smtClean="0"/>
-              <a:t>7/26/2022</a:t>
+              <a:t>9/1/2023</a:t>
             </a:fld>
             <a:endParaRPr lang="en-US"/>
           </a:p>
@@ -2071,7 +2072,7 @@
           <a:p>
             <a:fld id="{C2E56E9F-FC5E-47A3-91A2-81E36A74ACFE}" type="datetimeFigureOut">
               <a:rPr lang="en-US" smtClean="0"/>
-              <a:t>7/26/2022</a:t>
+              <a:t>9/1/2023</a:t>
             </a:fld>
             <a:endParaRPr lang="en-US"/>
           </a:p>
@@ -2382,7 +2383,7 @@
           <a:p>
             <a:fld id="{C2E56E9F-FC5E-47A3-91A2-81E36A74ACFE}" type="datetimeFigureOut">
               <a:rPr lang="en-US" smtClean="0"/>
-              <a:t>7/26/2022</a:t>
+              <a:t>9/1/2023</a:t>
             </a:fld>
             <a:endParaRPr lang="en-US"/>
           </a:p>
@@ -2670,7 +2671,7 @@
           <a:p>
             <a:fld id="{C2E56E9F-FC5E-47A3-91A2-81E36A74ACFE}" type="datetimeFigureOut">
               <a:rPr lang="en-US" smtClean="0"/>
-              <a:t>7/26/2022</a:t>
+              <a:t>9/1/2023</a:t>
             </a:fld>
             <a:endParaRPr lang="en-US"/>
           </a:p>
@@ -2911,7 +2912,7 @@
           <a:p>
             <a:fld id="{C2E56E9F-FC5E-47A3-91A2-81E36A74ACFE}" type="datetimeFigureOut">
               <a:rPr lang="en-US" smtClean="0"/>
-              <a:t>7/26/2022</a:t>
+              <a:t>9/1/2023</a:t>
             </a:fld>
             <a:endParaRPr lang="en-US"/>
           </a:p>
@@ -3455,6 +3456,136 @@
           <a:chExt cx="0" cy="0"/>
         </a:xfrm>
       </p:grpSpPr>
+      <p:sp>
+        <p:nvSpPr>
+          <p:cNvPr id="2" name="Title 1">
+            <a:extLst>
+              <a:ext uri="{FF2B5EF4-FFF2-40B4-BE49-F238E27FC236}">
+                <a16:creationId xmlns:a16="http://schemas.microsoft.com/office/drawing/2014/main" id="{AB210486-5A0C-3E6E-782D-912928D05A5C}"/>
+              </a:ext>
+            </a:extLst>
+          </p:cNvPr>
+          <p:cNvSpPr>
+            <a:spLocks noGrp="1"/>
+          </p:cNvSpPr>
+          <p:nvPr>
+            <p:ph type="title"/>
+          </p:nvPr>
+        </p:nvSpPr>
+        <p:spPr/>
+        <p:txBody>
+          <a:bodyPr/>
+          <a:lstStyle/>
+          <a:p>
+            <a:endParaRPr lang="en-US"/>
+          </a:p>
+        </p:txBody>
+      </p:sp>
+      <p:pic>
+        <p:nvPicPr>
+          <p:cNvPr id="5" name="Content Placeholder 4">
+            <a:extLst>
+              <a:ext uri="{FF2B5EF4-FFF2-40B4-BE49-F238E27FC236}">
+                <a16:creationId xmlns:a16="http://schemas.microsoft.com/office/drawing/2014/main" id="{3158D00D-11C5-1A4C-7C5E-450EDF4F78C0}"/>
+              </a:ext>
+            </a:extLst>
+          </p:cNvPr>
+          <p:cNvPicPr>
+            <a:picLocks noGrp="1" noChangeAspect="1"/>
+          </p:cNvPicPr>
+          <p:nvPr>
+            <p:ph idx="1"/>
+          </p:nvPr>
+        </p:nvPicPr>
+        <p:blipFill>
+          <a:blip r:embed="rId2">
+            <a:extLst>
+              <a:ext uri="{28A0092B-C50C-407E-A947-70E740481C1C}">
+                <a14:useLocalDpi xmlns:a14="http://schemas.microsoft.com/office/drawing/2010/main" val="0"/>
+              </a:ext>
+            </a:extLst>
+          </a:blip>
+          <a:srcRect l="56" r="56"/>
+          <a:stretch/>
+        </p:blipFill>
+        <p:spPr>
+          <a:xfrm>
+            <a:off x="867832" y="2468034"/>
+            <a:ext cx="10278535" cy="3086100"/>
+          </a:xfrm>
+        </p:spPr>
+      </p:pic>
+      <p:sp>
+        <p:nvSpPr>
+          <p:cNvPr id="6" name="TextBox 5">
+            <a:extLst>
+              <a:ext uri="{FF2B5EF4-FFF2-40B4-BE49-F238E27FC236}">
+                <a16:creationId xmlns:a16="http://schemas.microsoft.com/office/drawing/2014/main" id="{5DAB5F87-3F21-FD6E-A554-98F08ABB5B3E}"/>
+              </a:ext>
+            </a:extLst>
+          </p:cNvPr>
+          <p:cNvSpPr txBox="1"/>
+          <p:nvPr/>
+        </p:nvSpPr>
+        <p:spPr>
+          <a:xfrm>
+            <a:off x="896814" y="4680071"/>
+            <a:ext cx="1671145" cy="338554"/>
+          </a:xfrm>
+          <a:prstGeom prst="rect">
+            <a:avLst/>
+          </a:prstGeom>
+          <a:solidFill>
+            <a:srgbClr val="0076BB"/>
+          </a:solidFill>
+        </p:spPr>
+        <p:txBody>
+          <a:bodyPr wrap="square" rtlCol="0">
+            <a:spAutoFit/>
+          </a:bodyPr>
+          <a:lstStyle/>
+          <a:p>
+            <a:pPr algn="r"/>
+            <a:r>
+              <a:rPr lang="en-US" sz="1600" dirty="0">
+                <a:latin typeface="Helvetica" panose="020B0604020202020204" pitchFamily="34" charset="0"/>
+                <a:cs typeface="Helvetica" panose="020B0604020202020204" pitchFamily="34" charset="0"/>
+              </a:rPr>
+              <a:t>Ft. Lauderdale</a:t>
+            </a:r>
+          </a:p>
+        </p:txBody>
+      </p:sp>
+    </p:spTree>
+    <p:extLst>
+      <p:ext uri="{BB962C8B-B14F-4D97-AF65-F5344CB8AC3E}">
+        <p14:creationId xmlns:p14="http://schemas.microsoft.com/office/powerpoint/2010/main" val="3062344784"/>
+      </p:ext>
+    </p:extLst>
+  </p:cSld>
+  <p:clrMapOvr>
+    <a:masterClrMapping/>
+  </p:clrMapOvr>
+</p:sld>
+</file>
+
+<file path=ppt/slides/slide3.xml><?xml version="1.0" encoding="utf-8"?>
+<p:sld xmlns:a="http://schemas.openxmlformats.org/drawingml/2006/main" xmlns:r="http://schemas.openxmlformats.org/officeDocument/2006/relationships" xmlns:p="http://schemas.openxmlformats.org/presentationml/2006/main">
+  <p:cSld>
+    <p:spTree>
+      <p:nvGrpSpPr>
+        <p:cNvPr id="1" name=""/>
+        <p:cNvGrpSpPr/>
+        <p:nvPr/>
+      </p:nvGrpSpPr>
+      <p:grpSpPr>
+        <a:xfrm>
+          <a:off x="0" y="0"/>
+          <a:ext cx="0" cy="0"/>
+          <a:chOff x="0" y="0"/>
+          <a:chExt cx="0" cy="0"/>
+        </a:xfrm>
+      </p:grpSpPr>
       <p:grpSp>
         <p:nvGrpSpPr>
           <p:cNvPr id="8" name="Group 7">
@@ -3642,7 +3773,7 @@
 </p:sld>
 </file>
 
-<file path=ppt/slides/slide3.xml><?xml version="1.0" encoding="utf-8"?>
+<file path=ppt/slides/slide4.xml><?xml version="1.0" encoding="utf-8"?>
 <p:sld xmlns:a="http://schemas.openxmlformats.org/drawingml/2006/main" xmlns:r="http://schemas.openxmlformats.org/officeDocument/2006/relationships" xmlns:p="http://schemas.openxmlformats.org/presentationml/2006/main">
   <p:cSld>
     <p:spTree>

</xml_diff>